<commit_message>
- Update final view
</commit_message>
<xml_diff>
--- a/Presentation_Reservia_2_22102020.pptx
+++ b/Presentation_Reservia_2_22102020.pptx
@@ -8,11 +8,12 @@
     <p:sldId id="256" r:id="rId2"/>
     <p:sldId id="257" r:id="rId3"/>
     <p:sldId id="259" r:id="rId4"/>
-    <p:sldId id="258" r:id="rId5"/>
-    <p:sldId id="260" r:id="rId6"/>
-    <p:sldId id="261" r:id="rId7"/>
-    <p:sldId id="262" r:id="rId8"/>
-    <p:sldId id="263" r:id="rId9"/>
+    <p:sldId id="261" r:id="rId5"/>
+    <p:sldId id="265" r:id="rId6"/>
+    <p:sldId id="258" r:id="rId7"/>
+    <p:sldId id="264" r:id="rId8"/>
+    <p:sldId id="260" r:id="rId9"/>
+    <p:sldId id="263" r:id="rId10"/>
   </p:sldIdLst>
   <p:sldSz cx="12192000" cy="6858000"/>
   <p:notesSz cx="6858000" cy="9144000"/>
@@ -250,7 +251,7 @@
           <a:p>
             <a:fld id="{0B0CFB53-126D-44B7-8839-E87487598104}" type="datetimeFigureOut">
               <a:rPr lang="fr-FR" smtClean="0"/>
-              <a:t>02/01/2021</a:t>
+              <a:t>14/01/2021</a:t>
             </a:fld>
             <a:endParaRPr lang="fr-FR"/>
           </a:p>
@@ -420,7 +421,7 @@
           <a:p>
             <a:fld id="{0B0CFB53-126D-44B7-8839-E87487598104}" type="datetimeFigureOut">
               <a:rPr lang="fr-FR" smtClean="0"/>
-              <a:t>02/01/2021</a:t>
+              <a:t>14/01/2021</a:t>
             </a:fld>
             <a:endParaRPr lang="fr-FR"/>
           </a:p>
@@ -600,7 +601,7 @@
           <a:p>
             <a:fld id="{0B0CFB53-126D-44B7-8839-E87487598104}" type="datetimeFigureOut">
               <a:rPr lang="fr-FR" smtClean="0"/>
-              <a:t>02/01/2021</a:t>
+              <a:t>14/01/2021</a:t>
             </a:fld>
             <a:endParaRPr lang="fr-FR"/>
           </a:p>
@@ -770,7 +771,7 @@
           <a:p>
             <a:fld id="{0B0CFB53-126D-44B7-8839-E87487598104}" type="datetimeFigureOut">
               <a:rPr lang="fr-FR" smtClean="0"/>
-              <a:t>02/01/2021</a:t>
+              <a:t>14/01/2021</a:t>
             </a:fld>
             <a:endParaRPr lang="fr-FR"/>
           </a:p>
@@ -1016,7 +1017,7 @@
           <a:p>
             <a:fld id="{0B0CFB53-126D-44B7-8839-E87487598104}" type="datetimeFigureOut">
               <a:rPr lang="fr-FR" smtClean="0"/>
-              <a:t>02/01/2021</a:t>
+              <a:t>14/01/2021</a:t>
             </a:fld>
             <a:endParaRPr lang="fr-FR"/>
           </a:p>
@@ -1248,7 +1249,7 @@
           <a:p>
             <a:fld id="{0B0CFB53-126D-44B7-8839-E87487598104}" type="datetimeFigureOut">
               <a:rPr lang="fr-FR" smtClean="0"/>
-              <a:t>02/01/2021</a:t>
+              <a:t>14/01/2021</a:t>
             </a:fld>
             <a:endParaRPr lang="fr-FR"/>
           </a:p>
@@ -1615,7 +1616,7 @@
           <a:p>
             <a:fld id="{0B0CFB53-126D-44B7-8839-E87487598104}" type="datetimeFigureOut">
               <a:rPr lang="fr-FR" smtClean="0"/>
-              <a:t>02/01/2021</a:t>
+              <a:t>14/01/2021</a:t>
             </a:fld>
             <a:endParaRPr lang="fr-FR"/>
           </a:p>
@@ -1733,7 +1734,7 @@
           <a:p>
             <a:fld id="{0B0CFB53-126D-44B7-8839-E87487598104}" type="datetimeFigureOut">
               <a:rPr lang="fr-FR" smtClean="0"/>
-              <a:t>02/01/2021</a:t>
+              <a:t>14/01/2021</a:t>
             </a:fld>
             <a:endParaRPr lang="fr-FR"/>
           </a:p>
@@ -1828,7 +1829,7 @@
           <a:p>
             <a:fld id="{0B0CFB53-126D-44B7-8839-E87487598104}" type="datetimeFigureOut">
               <a:rPr lang="fr-FR" smtClean="0"/>
-              <a:t>02/01/2021</a:t>
+              <a:t>14/01/2021</a:t>
             </a:fld>
             <a:endParaRPr lang="fr-FR"/>
           </a:p>
@@ -2105,7 +2106,7 @@
           <a:p>
             <a:fld id="{0B0CFB53-126D-44B7-8839-E87487598104}" type="datetimeFigureOut">
               <a:rPr lang="fr-FR" smtClean="0"/>
-              <a:t>02/01/2021</a:t>
+              <a:t>14/01/2021</a:t>
             </a:fld>
             <a:endParaRPr lang="fr-FR"/>
           </a:p>
@@ -2358,7 +2359,7 @@
           <a:p>
             <a:fld id="{0B0CFB53-126D-44B7-8839-E87487598104}" type="datetimeFigureOut">
               <a:rPr lang="fr-FR" smtClean="0"/>
-              <a:t>02/01/2021</a:t>
+              <a:t>14/01/2021</a:t>
             </a:fld>
             <a:endParaRPr lang="fr-FR"/>
           </a:p>
@@ -2571,7 +2572,7 @@
           <a:p>
             <a:fld id="{0B0CFB53-126D-44B7-8839-E87487598104}" type="datetimeFigureOut">
               <a:rPr lang="fr-FR" smtClean="0"/>
-              <a:t>02/01/2021</a:t>
+              <a:t>14/01/2021</a:t>
             </a:fld>
             <a:endParaRPr lang="fr-FR"/>
           </a:p>
@@ -3082,8 +3083,8 @@
         </p:nvSpPr>
         <p:spPr>
           <a:xfrm>
-            <a:off x="1396779" y="1351818"/>
-            <a:ext cx="9862268" cy="4126631"/>
+            <a:off x="637756" y="930302"/>
+            <a:ext cx="10398654" cy="5080883"/>
           </a:xfrm>
           <a:solidFill>
             <a:schemeClr val="bg1">
@@ -3093,7 +3094,7 @@
         </p:spPr>
         <p:txBody>
           <a:bodyPr>
-            <a:normAutofit/>
+            <a:normAutofit fontScale="92500" lnSpcReduction="10000"/>
           </a:bodyPr>
           <a:lstStyle/>
           <a:p>
@@ -3105,134 +3106,248 @@
                 <a:latin typeface="Roboto" panose="02000000000000000000" pitchFamily="2" charset="0"/>
                 <a:ea typeface="Roboto" panose="02000000000000000000" pitchFamily="2" charset="0"/>
               </a:rPr>
-              <a:t>Les demandes sont </a:t>
-            </a:r>
-          </a:p>
-          <a:p>
-            <a:endParaRPr lang="fr-FR" dirty="0" smtClean="0"/>
+              <a:t>Les demandes sont :</a:t>
+            </a:r>
+          </a:p>
+          <a:p>
+            <a:endParaRPr lang="fr-FR" sz="3000" dirty="0" smtClean="0">
+              <a:solidFill>
+                <a:srgbClr val="0162FD"/>
+              </a:solidFill>
+              <a:latin typeface="Roboto" panose="02000000000000000000" pitchFamily="2" charset="0"/>
+              <a:ea typeface="Roboto" panose="02000000000000000000" pitchFamily="2" charset="0"/>
+            </a:endParaRPr>
           </a:p>
           <a:p>
             <a:pPr algn="l"/>
             <a:r>
-              <a:rPr lang="fr-FR" sz="2000" dirty="0">
-                <a:latin typeface="Nunito" panose="02000503030000020003" pitchFamily="2" charset="0"/>
-              </a:rPr>
-              <a:t>· Réaliser en HTML et CSS l’intégration d’une maquette photo </a:t>
-            </a:r>
-            <a:endParaRPr lang="fr-FR" sz="2000" dirty="0" smtClean="0">
+              <a:rPr lang="fr-FR" sz="1800" dirty="0" smtClean="0">
+                <a:latin typeface="Nunito" panose="02000503030000020003" pitchFamily="2" charset="0"/>
+              </a:rPr>
+              <a:t>· </a:t>
+            </a:r>
+            <a:r>
+              <a:rPr lang="fr-FR" sz="1800" dirty="0">
+                <a:latin typeface="Nunito" panose="02000503030000020003" pitchFamily="2" charset="0"/>
+              </a:rPr>
+              <a:t>Réaliser en HTML et CSS l’intégration d’une maquette photo </a:t>
+            </a:r>
+          </a:p>
+          <a:p>
+            <a:pPr algn="l"/>
+            <a:r>
+              <a:rPr lang="fr-FR" sz="2000" dirty="0" smtClean="0">
+                <a:latin typeface="Nunito" panose="02000503030000020003" pitchFamily="2" charset="0"/>
+              </a:rPr>
+              <a:t>· </a:t>
+            </a:r>
+            <a:r>
+              <a:rPr lang="fr-FR" sz="1800" dirty="0" smtClean="0">
+                <a:latin typeface="Nunito" panose="02000503030000020003" pitchFamily="2" charset="0"/>
+              </a:rPr>
+              <a:t>D'utiliser une police et des couleurs spécifique</a:t>
+            </a:r>
+          </a:p>
+          <a:p>
+            <a:pPr algn="l"/>
+            <a:r>
+              <a:rPr lang="fr-FR" sz="1800" dirty="0" smtClean="0">
+                <a:latin typeface="Nunito" panose="02000503030000020003" pitchFamily="2" charset="0"/>
+              </a:rPr>
+              <a:t>· </a:t>
+            </a:r>
+            <a:r>
+              <a:rPr lang="fr-FR" sz="1800" dirty="0">
+                <a:latin typeface="Nunito" panose="02000503030000020003" pitchFamily="2" charset="0"/>
+              </a:rPr>
+              <a:t>De rendre le site web compatible sur Google, Mozilla </a:t>
+            </a:r>
+            <a:r>
+              <a:rPr lang="fr-FR" sz="1800" dirty="0" smtClean="0">
+                <a:latin typeface="Nunito" panose="02000503030000020003" pitchFamily="2" charset="0"/>
+              </a:rPr>
+              <a:t>Firefox </a:t>
+            </a:r>
+            <a:r>
+              <a:rPr lang="fr-FR" sz="1800" dirty="0">
+                <a:latin typeface="Nunito" panose="02000503030000020003" pitchFamily="2" charset="0"/>
+              </a:rPr>
+              <a:t>et Explorer</a:t>
+            </a:r>
+          </a:p>
+          <a:p>
+            <a:pPr algn="l"/>
+            <a:r>
+              <a:rPr lang="fr-FR" sz="1800" dirty="0">
+                <a:latin typeface="Nunito" panose="02000503030000020003" pitchFamily="2" charset="0"/>
+              </a:rPr>
+              <a:t>· D'utilisé le site de </a:t>
+            </a:r>
+            <a:r>
+              <a:rPr lang="fr-FR" sz="1800" dirty="0" smtClean="0">
+                <a:latin typeface="Nunito" panose="02000503030000020003" pitchFamily="2" charset="0"/>
+              </a:rPr>
+              <a:t>Font-</a:t>
+            </a:r>
+            <a:r>
+              <a:rPr lang="fr-FR" sz="1800" dirty="0" err="1" smtClean="0">
+                <a:latin typeface="Nunito" panose="02000503030000020003" pitchFamily="2" charset="0"/>
+              </a:rPr>
+              <a:t>awesome</a:t>
+            </a:r>
+            <a:r>
+              <a:rPr lang="fr-FR" sz="1800" dirty="0" smtClean="0">
+                <a:latin typeface="Nunito" panose="02000503030000020003" pitchFamily="2" charset="0"/>
+              </a:rPr>
+              <a:t> </a:t>
+            </a:r>
+            <a:r>
+              <a:rPr lang="fr-FR" sz="1800" dirty="0">
+                <a:latin typeface="Nunito" panose="02000503030000020003" pitchFamily="2" charset="0"/>
+              </a:rPr>
+              <a:t>pour les icônes et les </a:t>
+            </a:r>
+            <a:r>
+              <a:rPr lang="fr-FR" sz="1800" dirty="0" smtClean="0">
+                <a:latin typeface="Nunito" panose="02000503030000020003" pitchFamily="2" charset="0"/>
+              </a:rPr>
+              <a:t>polices</a:t>
+            </a:r>
+          </a:p>
+          <a:p>
+            <a:pPr algn="l"/>
+            <a:r>
+              <a:rPr lang="fr-FR" sz="1800" dirty="0">
+                <a:latin typeface="Nunito" panose="02000503030000020003" pitchFamily="2" charset="0"/>
+              </a:rPr>
+              <a:t>· Réaliser 4 versions responsive design à l’aide des </a:t>
+            </a:r>
+            <a:r>
+              <a:rPr lang="fr-FR" sz="1800" dirty="0" smtClean="0">
+                <a:latin typeface="Nunito" panose="02000503030000020003" pitchFamily="2" charset="0"/>
+              </a:rPr>
+              <a:t>media </a:t>
+            </a:r>
+            <a:r>
+              <a:rPr lang="fr-FR" sz="1800" dirty="0" err="1" smtClean="0">
+                <a:latin typeface="Nunito" panose="02000503030000020003" pitchFamily="2" charset="0"/>
+              </a:rPr>
+              <a:t>queries</a:t>
+            </a:r>
+            <a:r>
+              <a:rPr lang="fr-FR" sz="1800" dirty="0" smtClean="0">
+                <a:latin typeface="Nunito" panose="02000503030000020003" pitchFamily="2" charset="0"/>
+              </a:rPr>
+              <a:t> </a:t>
+            </a:r>
+            <a:endParaRPr lang="fr-FR" sz="1800" dirty="0">
               <a:latin typeface="Nunito" panose="02000503030000020003" pitchFamily="2" charset="0"/>
             </a:endParaRPr>
           </a:p>
           <a:p>
             <a:pPr algn="l"/>
             <a:r>
-              <a:rPr lang="fr-FR" sz="2000" dirty="0" smtClean="0">
+              <a:rPr lang="fr-FR" sz="1800" dirty="0">
+                <a:latin typeface="Nunito" panose="02000503030000020003" pitchFamily="2" charset="0"/>
+              </a:rPr>
+              <a:t>En plus :</a:t>
+            </a:r>
+          </a:p>
+          <a:p>
+            <a:pPr algn="l"/>
+            <a:r>
+              <a:rPr lang="fr-FR" sz="1800" dirty="0" smtClean="0">
                 <a:latin typeface="Nunito" panose="02000503030000020003" pitchFamily="2" charset="0"/>
               </a:rPr>
               <a:t>· </a:t>
             </a:r>
             <a:r>
-              <a:rPr lang="fr-FR" sz="2000" dirty="0">
-                <a:latin typeface="Nunito" panose="02000503030000020003" pitchFamily="2" charset="0"/>
-              </a:rPr>
-              <a:t>Mettre en place toutes les balises afin d’optimiser leur sémantique </a:t>
-            </a:r>
-            <a:endParaRPr lang="fr-FR" sz="2000" dirty="0" smtClean="0">
+              <a:rPr lang="fr-FR" sz="1800" dirty="0">
+                <a:latin typeface="Nunito" panose="02000503030000020003" pitchFamily="2" charset="0"/>
+              </a:rPr>
+              <a:t>Optimiser </a:t>
+            </a:r>
+            <a:r>
+              <a:rPr lang="fr-FR" sz="1800" dirty="0" smtClean="0">
+                <a:latin typeface="Nunito" panose="02000503030000020003" pitchFamily="2" charset="0"/>
+              </a:rPr>
+              <a:t>la </a:t>
+            </a:r>
+            <a:r>
+              <a:rPr lang="fr-FR" sz="1800" dirty="0">
+                <a:latin typeface="Nunito" panose="02000503030000020003" pitchFamily="2" charset="0"/>
+              </a:rPr>
+              <a:t>bonne sémantique des balises, notamment pour faciliter le référencement</a:t>
+            </a:r>
+          </a:p>
+          <a:p>
+            <a:pPr algn="l"/>
+            <a:r>
+              <a:rPr lang="fr-FR" sz="1800" dirty="0" smtClean="0">
+                <a:latin typeface="Nunito" panose="02000503030000020003" pitchFamily="2" charset="0"/>
+              </a:rPr>
+              <a:t>· </a:t>
+            </a:r>
+            <a:r>
+              <a:rPr lang="fr-FR" sz="1800" dirty="0">
+                <a:latin typeface="Nunito" panose="02000503030000020003" pitchFamily="2" charset="0"/>
+              </a:rPr>
+              <a:t>Écrire un code HTML propre et organiser, dans la possibilité que le site web </a:t>
+            </a:r>
+            <a:r>
+              <a:rPr lang="fr-FR" sz="1800" dirty="0" smtClean="0">
+                <a:latin typeface="Nunito" panose="02000503030000020003" pitchFamily="2" charset="0"/>
+              </a:rPr>
+              <a:t>accueil des </a:t>
+            </a:r>
+            <a:r>
+              <a:rPr lang="fr-FR" sz="1800" dirty="0">
+                <a:latin typeface="Nunito" panose="02000503030000020003" pitchFamily="2" charset="0"/>
+              </a:rPr>
+              <a:t> </a:t>
+            </a:r>
+            <a:r>
+              <a:rPr lang="fr-FR" sz="1800" dirty="0" smtClean="0">
+                <a:latin typeface="Nunito" panose="02000503030000020003" pitchFamily="2" charset="0"/>
+              </a:rPr>
+              <a:t>         </a:t>
+            </a:r>
+          </a:p>
+          <a:p>
+            <a:pPr algn="l"/>
+            <a:r>
+              <a:rPr lang="fr-FR" sz="1800" dirty="0">
+                <a:latin typeface="Nunito" panose="02000503030000020003" pitchFamily="2" charset="0"/>
+              </a:rPr>
+              <a:t> </a:t>
+            </a:r>
+            <a:r>
+              <a:rPr lang="fr-FR" sz="1800" dirty="0" smtClean="0">
+                <a:latin typeface="Nunito" panose="02000503030000020003" pitchFamily="2" charset="0"/>
+              </a:rPr>
+              <a:t>  fonctionnalités d’un autre langage</a:t>
+            </a:r>
+          </a:p>
+          <a:p>
+            <a:pPr algn="l"/>
+            <a:r>
+              <a:rPr lang="fr-FR" sz="1800" dirty="0" smtClean="0">
+                <a:latin typeface="Nunito" panose="02000503030000020003" pitchFamily="2" charset="0"/>
+              </a:rPr>
+              <a:t>· </a:t>
+            </a:r>
+            <a:r>
+              <a:rPr lang="fr-FR" sz="1800" dirty="0">
+                <a:latin typeface="Nunito" panose="02000503030000020003" pitchFamily="2" charset="0"/>
+              </a:rPr>
+              <a:t>Commencer sur une structure simple mais solide </a:t>
+            </a:r>
+            <a:endParaRPr lang="fr-FR" sz="1800" dirty="0" smtClean="0">
               <a:latin typeface="Nunito" panose="02000503030000020003" pitchFamily="2" charset="0"/>
             </a:endParaRPr>
           </a:p>
           <a:p>
             <a:pPr algn="l"/>
-            <a:r>
-              <a:rPr lang="fr-FR" sz="2000" dirty="0" smtClean="0">
-                <a:latin typeface="Nunito" panose="02000503030000020003" pitchFamily="2" charset="0"/>
-              </a:rPr>
-              <a:t>· </a:t>
-            </a:r>
-            <a:r>
-              <a:rPr lang="fr-FR" sz="2000" dirty="0">
-                <a:latin typeface="Nunito" panose="02000503030000020003" pitchFamily="2" charset="0"/>
-              </a:rPr>
-              <a:t>Réaliser 4 versions responsive design à l’aide des media </a:t>
-            </a:r>
-            <a:r>
-              <a:rPr lang="fr-FR" sz="2000" dirty="0" err="1">
-                <a:latin typeface="Nunito" panose="02000503030000020003" pitchFamily="2" charset="0"/>
-              </a:rPr>
-              <a:t>queries</a:t>
-            </a:r>
-            <a:r>
-              <a:rPr lang="fr-FR" sz="2000" dirty="0">
-                <a:latin typeface="Nunito" panose="02000503030000020003" pitchFamily="2" charset="0"/>
-              </a:rPr>
-              <a:t> </a:t>
-            </a:r>
-            <a:endParaRPr lang="fr-FR" sz="2000" dirty="0" smtClean="0">
-              <a:latin typeface="Nunito" panose="02000503030000020003" pitchFamily="2" charset="0"/>
-            </a:endParaRPr>
-          </a:p>
-          <a:p>
-            <a:pPr algn="l"/>
-            <a:r>
-              <a:rPr lang="fr-FR" sz="2000" dirty="0" smtClean="0">
-                <a:latin typeface="Nunito" panose="02000503030000020003" pitchFamily="2" charset="0"/>
-              </a:rPr>
-              <a:t>· </a:t>
-            </a:r>
-            <a:r>
-              <a:rPr lang="fr-FR" sz="2000" dirty="0">
-                <a:latin typeface="Nunito" panose="02000503030000020003" pitchFamily="2" charset="0"/>
-              </a:rPr>
-              <a:t>Écrire un code HTML propre et organiser, dans la possibilité que le site web </a:t>
-            </a:r>
-            <a:r>
-              <a:rPr lang="fr-FR" sz="2000" dirty="0" smtClean="0">
-                <a:latin typeface="Nunito" panose="02000503030000020003" pitchFamily="2" charset="0"/>
-              </a:rPr>
-              <a:t>                accueil des fonctionnalités </a:t>
-            </a:r>
-            <a:r>
-              <a:rPr lang="fr-FR" sz="2000" dirty="0">
-                <a:latin typeface="Nunito" panose="02000503030000020003" pitchFamily="2" charset="0"/>
-              </a:rPr>
-              <a:t>d’un autre langage </a:t>
-            </a:r>
-            <a:endParaRPr lang="fr-FR" sz="2000" dirty="0" smtClean="0">
-              <a:latin typeface="Nunito" panose="02000503030000020003" pitchFamily="2" charset="0"/>
-            </a:endParaRPr>
-          </a:p>
-          <a:p>
-            <a:pPr algn="l"/>
-            <a:r>
-              <a:rPr lang="fr-FR" sz="2000" dirty="0" smtClean="0">
-                <a:latin typeface="Nunito" panose="02000503030000020003" pitchFamily="2" charset="0"/>
-              </a:rPr>
-              <a:t>· </a:t>
-            </a:r>
-            <a:r>
-              <a:rPr lang="fr-FR" sz="2000" dirty="0">
-                <a:latin typeface="Nunito" panose="02000503030000020003" pitchFamily="2" charset="0"/>
-              </a:rPr>
-              <a:t>Commencer sur une structure simple mais solide </a:t>
-            </a:r>
-            <a:endParaRPr lang="fr-FR" sz="2000" dirty="0" smtClean="0">
-              <a:latin typeface="Nunito" panose="02000503030000020003" pitchFamily="2" charset="0"/>
-            </a:endParaRPr>
-          </a:p>
-          <a:p>
-            <a:pPr algn="l"/>
-            <a:r>
-              <a:rPr lang="fr-FR" sz="2000" dirty="0" smtClean="0">
-                <a:latin typeface="Nunito" panose="02000503030000020003" pitchFamily="2" charset="0"/>
-              </a:rPr>
-              <a:t>· </a:t>
-            </a:r>
-            <a:r>
-              <a:rPr lang="fr-FR" sz="2000" dirty="0">
-                <a:latin typeface="Nunito" panose="02000503030000020003" pitchFamily="2" charset="0"/>
-              </a:rPr>
-              <a:t>Optimiser les sémantiques des balises HTML pour le référencement </a:t>
-            </a:r>
             <a:r>
               <a:rPr lang="fr-FR" sz="2000" dirty="0"/>
               <a:t/>
@@ -3415,19 +3530,7 @@
               <a:rPr lang="fr-FR" sz="1250" dirty="0" smtClean="0">
                 <a:latin typeface="Nunito" panose="02000503030000020003" pitchFamily="2" charset="0"/>
               </a:rPr>
-              <a:t>· Elle </a:t>
-            </a:r>
-            <a:r>
-              <a:rPr lang="fr-FR" sz="1250" dirty="0" smtClean="0">
-                <a:latin typeface="Nunito" panose="02000503030000020003" pitchFamily="2" charset="0"/>
-              </a:rPr>
-              <a:t>peut </a:t>
-            </a:r>
-            <a:r>
-              <a:rPr lang="fr-FR" sz="1250" dirty="0" smtClean="0">
-                <a:latin typeface="Nunito" panose="02000503030000020003" pitchFamily="2" charset="0"/>
-              </a:rPr>
-              <a:t>aussi influer sur le référencement, accessibilité des robots des différents navigateurs web</a:t>
+              <a:t>· Elle peut aussi influer sur le référencement, accessibilité des robots des différents navigateurs web</a:t>
             </a:r>
           </a:p>
           <a:p>
@@ -3495,6 +3598,291 @@
           <a:chExt cx="0" cy="0"/>
         </a:xfrm>
       </p:grpSpPr>
+      <p:sp>
+        <p:nvSpPr>
+          <p:cNvPr id="2" name="Sous-titre 1"/>
+          <p:cNvSpPr>
+            <a:spLocks noGrp="1"/>
+          </p:cNvSpPr>
+          <p:nvPr>
+            <p:ph type="subTitle" idx="1"/>
+          </p:nvPr>
+        </p:nvSpPr>
+        <p:spPr>
+          <a:xfrm>
+            <a:off x="1396779" y="1351818"/>
+            <a:ext cx="9862268" cy="4969469"/>
+          </a:xfrm>
+          <a:solidFill>
+            <a:schemeClr val="bg1">
+              <a:lumMod val="95000"/>
+            </a:schemeClr>
+          </a:solidFill>
+        </p:spPr>
+        <p:txBody>
+          <a:bodyPr>
+            <a:normAutofit/>
+          </a:bodyPr>
+          <a:lstStyle/>
+          <a:p>
+            <a:r>
+              <a:rPr lang="fr-FR" sz="3000" dirty="0" smtClean="0">
+                <a:solidFill>
+                  <a:srgbClr val="0162FD"/>
+                </a:solidFill>
+                <a:latin typeface="Roboto" panose="02000000000000000000" pitchFamily="2" charset="0"/>
+                <a:ea typeface="Roboto" panose="02000000000000000000" pitchFamily="2" charset="0"/>
+              </a:rPr>
+              <a:t>Un CSS générique ?</a:t>
+            </a:r>
+          </a:p>
+          <a:p>
+            <a:r>
+              <a:rPr lang="fr-FR" sz="1500" dirty="0">
+                <a:latin typeface="Nunito" panose="02000503030000020003" pitchFamily="2" charset="0"/>
+              </a:rPr>
+              <a:t>Utiliser une police et des couleurs spécifique, ici ça sera la typographie « </a:t>
+            </a:r>
+            <a:r>
+              <a:rPr lang="fr-FR" sz="1500" dirty="0" err="1">
+                <a:latin typeface="Nunito" panose="02000503030000020003" pitchFamily="2" charset="0"/>
+              </a:rPr>
+              <a:t>Raleway</a:t>
+            </a:r>
+            <a:r>
+              <a:rPr lang="fr-FR" sz="1500" dirty="0">
+                <a:latin typeface="Nunito" panose="02000503030000020003" pitchFamily="2" charset="0"/>
+              </a:rPr>
+              <a:t> »</a:t>
+            </a:r>
+          </a:p>
+          <a:p>
+            <a:r>
+              <a:rPr lang="fr-FR" sz="1500" dirty="0">
+                <a:latin typeface="Nunito" panose="02000503030000020003" pitchFamily="2" charset="0"/>
+              </a:rPr>
+              <a:t>Deux nuances de bleu et un gris clair pour le fond et pour cela :</a:t>
+            </a:r>
+          </a:p>
+          <a:p>
+            <a:r>
+              <a:rPr lang="fr-FR" sz="1500" dirty="0">
+                <a:latin typeface="Nunito" panose="02000503030000020003" pitchFamily="2" charset="0"/>
+              </a:rPr>
+              <a:t>         · J’ai préféré automatiser les balises </a:t>
+            </a:r>
+          </a:p>
+          <a:p>
+            <a:r>
+              <a:rPr lang="fr-FR" sz="1500" dirty="0">
+                <a:latin typeface="Nunito" panose="02000503030000020003" pitchFamily="2" charset="0"/>
+              </a:rPr>
+              <a:t>   qui doivent contenir du texte.</a:t>
+            </a:r>
+          </a:p>
+          <a:p>
+            <a:r>
+              <a:rPr lang="fr-FR" sz="1500" dirty="0">
+                <a:latin typeface="Nunito" panose="02000503030000020003" pitchFamily="2" charset="0"/>
+              </a:rPr>
+              <a:t>         · Aller plus loin en créant des classes</a:t>
+            </a:r>
+          </a:p>
+          <a:p>
+            <a:r>
+              <a:rPr lang="fr-FR" sz="1500" dirty="0">
+                <a:latin typeface="Nunito" panose="02000503030000020003" pitchFamily="2" charset="0"/>
+              </a:rPr>
+              <a:t>                    CSS pour facilité la structure des Flex-box,</a:t>
+            </a:r>
+          </a:p>
+          <a:p>
+            <a:r>
+              <a:rPr lang="fr-FR" sz="1500" dirty="0">
+                <a:latin typeface="Nunito" panose="02000503030000020003" pitchFamily="2" charset="0"/>
+              </a:rPr>
+              <a:t>                       la mise en couleur, supprimé les décorations </a:t>
+            </a:r>
+          </a:p>
+          <a:p>
+            <a:r>
+              <a:rPr lang="fr-FR" sz="1500" dirty="0">
+                <a:latin typeface="Nunito" panose="02000503030000020003" pitchFamily="2" charset="0"/>
+              </a:rPr>
+              <a:t>            de certaines balises comme les listes à </a:t>
+            </a:r>
+          </a:p>
+          <a:p>
+            <a:r>
+              <a:rPr lang="fr-FR" sz="1500" dirty="0">
+                <a:latin typeface="Nunito" panose="02000503030000020003" pitchFamily="2" charset="0"/>
+              </a:rPr>
+              <a:t>       puce ou la couleur bleue d’un lien</a:t>
+            </a:r>
+            <a:endParaRPr lang="fr-FR" sz="1500" dirty="0" smtClean="0">
+              <a:latin typeface="Nunito" panose="02000503030000020003" pitchFamily="2" charset="0"/>
+            </a:endParaRPr>
+          </a:p>
+          <a:p>
+            <a:endParaRPr lang="fr-FR" sz="1500" dirty="0">
+              <a:latin typeface="Nunito" panose="02000503030000020003" pitchFamily="2" charset="0"/>
+            </a:endParaRPr>
+          </a:p>
+          <a:p>
+            <a:endParaRPr lang="fr-FR" sz="1500" dirty="0" smtClean="0">
+              <a:latin typeface="Nunito" panose="02000503030000020003" pitchFamily="2" charset="0"/>
+            </a:endParaRPr>
+          </a:p>
+          <a:p>
+            <a:endParaRPr lang="fr-FR" sz="1500" dirty="0">
+              <a:latin typeface="Nunito" panose="02000503030000020003" pitchFamily="2" charset="0"/>
+            </a:endParaRPr>
+          </a:p>
+          <a:p>
+            <a:endParaRPr lang="fr-FR" sz="1500" dirty="0" smtClean="0">
+              <a:latin typeface="Nunito" panose="02000503030000020003" pitchFamily="2" charset="0"/>
+            </a:endParaRPr>
+          </a:p>
+          <a:p>
+            <a:endParaRPr lang="fr-FR" sz="1500" dirty="0" smtClean="0">
+              <a:latin typeface="Nunito" panose="02000503030000020003" pitchFamily="2" charset="0"/>
+            </a:endParaRPr>
+          </a:p>
+          <a:p>
+            <a:endParaRPr lang="fr-FR" sz="1500" dirty="0">
+              <a:latin typeface="Nunito" panose="02000503030000020003" pitchFamily="2" charset="0"/>
+            </a:endParaRPr>
+          </a:p>
+          <a:p>
+            <a:endParaRPr lang="fr-FR" dirty="0" smtClean="0"/>
+          </a:p>
+          <a:p>
+            <a:endParaRPr lang="fr-FR" sz="1200" dirty="0" smtClean="0">
+              <a:latin typeface="Nunito" panose="02000503030000020003" pitchFamily="2" charset="0"/>
+            </a:endParaRPr>
+          </a:p>
+        </p:txBody>
+      </p:sp>
+      <p:pic>
+        <p:nvPicPr>
+          <p:cNvPr id="5" name="Image 4"/>
+          <p:cNvPicPr>
+            <a:picLocks noChangeAspect="1"/>
+          </p:cNvPicPr>
+          <p:nvPr/>
+        </p:nvPicPr>
+        <p:blipFill>
+          <a:blip r:embed="rId2">
+            <a:extLst>
+              <a:ext uri="{28A0092B-C50C-407E-A947-70E740481C1C}">
+                <a14:useLocalDpi xmlns:a14="http://schemas.microsoft.com/office/drawing/2010/main" val="0"/>
+              </a:ext>
+            </a:extLst>
+          </a:blip>
+          <a:stretch>
+            <a:fillRect/>
+          </a:stretch>
+        </p:blipFill>
+        <p:spPr>
+          <a:xfrm>
+            <a:off x="146641" y="113309"/>
+            <a:ext cx="491115" cy="665919"/>
+          </a:xfrm>
+          <a:prstGeom prst="rect">
+            <a:avLst/>
+          </a:prstGeom>
+        </p:spPr>
+      </p:pic>
+      <p:pic>
+        <p:nvPicPr>
+          <p:cNvPr id="3" name="Image 2"/>
+          <p:cNvPicPr>
+            <a:picLocks noChangeAspect="1"/>
+          </p:cNvPicPr>
+          <p:nvPr/>
+        </p:nvPicPr>
+        <p:blipFill>
+          <a:blip r:embed="rId3">
+            <a:extLst>
+              <a:ext uri="{28A0092B-C50C-407E-A947-70E740481C1C}">
+                <a14:useLocalDpi xmlns:a14="http://schemas.microsoft.com/office/drawing/2010/main" val="0"/>
+              </a:ext>
+            </a:extLst>
+          </a:blip>
+          <a:stretch>
+            <a:fillRect/>
+          </a:stretch>
+        </p:blipFill>
+        <p:spPr>
+          <a:xfrm>
+            <a:off x="1522247" y="2877141"/>
+            <a:ext cx="3323406" cy="3219119"/>
+          </a:xfrm>
+          <a:prstGeom prst="rect">
+            <a:avLst/>
+          </a:prstGeom>
+        </p:spPr>
+      </p:pic>
+      <p:pic>
+        <p:nvPicPr>
+          <p:cNvPr id="4" name="Image 3"/>
+          <p:cNvPicPr>
+            <a:picLocks noChangeAspect="1"/>
+          </p:cNvPicPr>
+          <p:nvPr/>
+        </p:nvPicPr>
+        <p:blipFill>
+          <a:blip r:embed="rId4">
+            <a:extLst>
+              <a:ext uri="{28A0092B-C50C-407E-A947-70E740481C1C}">
+                <a14:useLocalDpi xmlns:a14="http://schemas.microsoft.com/office/drawing/2010/main" val="0"/>
+              </a:ext>
+            </a:extLst>
+          </a:blip>
+          <a:stretch>
+            <a:fillRect/>
+          </a:stretch>
+        </p:blipFill>
+        <p:spPr>
+          <a:xfrm>
+            <a:off x="8984563" y="3151186"/>
+            <a:ext cx="2126223" cy="2945074"/>
+          </a:xfrm>
+          <a:prstGeom prst="rect">
+            <a:avLst/>
+          </a:prstGeom>
+        </p:spPr>
+      </p:pic>
+    </p:spTree>
+    <p:extLst>
+      <p:ext uri="{BB962C8B-B14F-4D97-AF65-F5344CB8AC3E}">
+        <p14:creationId xmlns:p14="http://schemas.microsoft.com/office/powerpoint/2010/main" val="870887834"/>
+      </p:ext>
+    </p:extLst>
+  </p:cSld>
+  <p:clrMapOvr>
+    <a:masterClrMapping/>
+  </p:clrMapOvr>
+</p:sld>
+</file>
+
+<file path=ppt/slides/slide5.xml><?xml version="1.0" encoding="utf-8"?>
+<p:sld xmlns:a="http://schemas.openxmlformats.org/drawingml/2006/main" xmlns:r="http://schemas.openxmlformats.org/officeDocument/2006/relationships" xmlns:p="http://schemas.openxmlformats.org/presentationml/2006/main">
+  <p:cSld>
+    <p:spTree>
+      <p:nvGrpSpPr>
+        <p:cNvPr id="1" name=""/>
+        <p:cNvGrpSpPr/>
+        <p:nvPr/>
+      </p:nvGrpSpPr>
+      <p:grpSpPr>
+        <a:xfrm>
+          <a:off x="0" y="0"/>
+          <a:ext cx="0" cy="0"/>
+          <a:chOff x="0" y="0"/>
+          <a:chExt cx="0" cy="0"/>
+        </a:xfrm>
+      </p:grpSpPr>
       <p:pic>
         <p:nvPicPr>
           <p:cNvPr id="3" name="Image 2"/>
@@ -3537,8 +3925,8 @@
         </p:nvSpPr>
         <p:spPr>
           <a:xfrm>
-            <a:off x="1396779" y="1351818"/>
-            <a:ext cx="9862268" cy="4178430"/>
+            <a:off x="1428585" y="1351817"/>
+            <a:ext cx="9862268" cy="4722980"/>
           </a:xfrm>
           <a:solidFill>
             <a:schemeClr val="bg1">
@@ -3560,12 +3948,32 @@
                 <a:latin typeface="Roboto" panose="02000000000000000000" pitchFamily="2" charset="0"/>
                 <a:ea typeface="Roboto" panose="02000000000000000000" pitchFamily="2" charset="0"/>
               </a:rPr>
-              <a:t>Le responsive design</a:t>
+              <a:t>Font-</a:t>
+            </a:r>
+            <a:r>
+              <a:rPr lang="fr-FR" sz="3000" dirty="0" err="1" smtClean="0">
+                <a:solidFill>
+                  <a:srgbClr val="0162FD"/>
+                </a:solidFill>
+                <a:latin typeface="Roboto" panose="02000000000000000000" pitchFamily="2" charset="0"/>
+                <a:ea typeface="Roboto" panose="02000000000000000000" pitchFamily="2" charset="0"/>
+              </a:rPr>
+              <a:t>Awesome</a:t>
+            </a:r>
+            <a:r>
+              <a:rPr lang="fr-FR" sz="3000" dirty="0" smtClean="0">
+                <a:solidFill>
+                  <a:srgbClr val="0162FD"/>
+                </a:solidFill>
+                <a:latin typeface="Roboto" panose="02000000000000000000" pitchFamily="2" charset="0"/>
+                <a:ea typeface="Roboto" panose="02000000000000000000" pitchFamily="2" charset="0"/>
+              </a:rPr>
+              <a:t> :</a:t>
             </a:r>
           </a:p>
           <a:p>
             <a:pPr algn="l"/>
-            <a:endParaRPr lang="fr-FR" sz="3000" dirty="0">
+            <a:endParaRPr lang="fr-FR" sz="800" dirty="0">
               <a:solidFill>
                 <a:srgbClr val="0162FD"/>
               </a:solidFill>
@@ -3575,113 +3983,75 @@
           </a:p>
           <a:p>
             <a:pPr algn="l"/>
-            <a:endParaRPr lang="fr-FR" sz="3000" dirty="0" smtClean="0">
-              <a:solidFill>
-                <a:srgbClr val="0162FD"/>
-              </a:solidFill>
-              <a:latin typeface="Roboto" panose="02000000000000000000" pitchFamily="2" charset="0"/>
+            <a:r>
+              <a:rPr lang="fr-FR" sz="1500" dirty="0" smtClean="0">
+                <a:latin typeface="Nunito" panose="02000503030000020003" pitchFamily="2" charset="0"/>
+                <a:ea typeface="Roboto" panose="02000000000000000000" pitchFamily="2" charset="0"/>
+              </a:rPr>
+              <a:t>· Utilisé le site de Font-</a:t>
+            </a:r>
+            <a:r>
+              <a:rPr lang="fr-FR" sz="1500" dirty="0" err="1" smtClean="0">
+                <a:latin typeface="Nunito" panose="02000503030000020003" pitchFamily="2" charset="0"/>
+                <a:ea typeface="Roboto" panose="02000000000000000000" pitchFamily="2" charset="0"/>
+              </a:rPr>
+              <a:t>awesome</a:t>
+            </a:r>
+            <a:r>
+              <a:rPr lang="fr-FR" sz="1500" dirty="0" smtClean="0">
+                <a:latin typeface="Nunito" panose="02000503030000020003" pitchFamily="2" charset="0"/>
+                <a:ea typeface="Roboto" panose="02000000000000000000" pitchFamily="2" charset="0"/>
+              </a:rPr>
+              <a:t> pour les icones SVG en ligne :</a:t>
+            </a:r>
+          </a:p>
+          <a:p>
+            <a:pPr algn="l"/>
+            <a:endParaRPr lang="fr-FR" sz="1500" dirty="0" smtClean="0">
+              <a:latin typeface="Nunito" panose="02000503030000020003" pitchFamily="2" charset="0"/>
               <a:ea typeface="Roboto" panose="02000000000000000000" pitchFamily="2" charset="0"/>
             </a:endParaRPr>
           </a:p>
           <a:p>
             <a:pPr algn="l"/>
-            <a:r>
-              <a:rPr lang="fr-FR" sz="1400" dirty="0"/>
-              <a:t>· Organisation en ordre décroissant du responsive design, </a:t>
-            </a:r>
-            <a:endParaRPr lang="fr-FR" sz="1400" dirty="0" smtClean="0"/>
-          </a:p>
-          <a:p>
-            <a:pPr algn="l"/>
-            <a:r>
-              <a:rPr lang="fr-FR" sz="1400" dirty="0" smtClean="0"/>
-              <a:t>  de </a:t>
-            </a:r>
-            <a:r>
-              <a:rPr lang="fr-FR" sz="1400" dirty="0"/>
-              <a:t>la déclaration · En passant par les noms des classes qui </a:t>
-            </a:r>
-            <a:endParaRPr lang="fr-FR" sz="1400" dirty="0" smtClean="0"/>
-          </a:p>
-          <a:p>
-            <a:pPr algn="l"/>
-            <a:r>
-              <a:rPr lang="fr-FR" sz="1400" dirty="0" smtClean="0"/>
-              <a:t> doit être </a:t>
-            </a:r>
-            <a:r>
-              <a:rPr lang="fr-FR" sz="1400" dirty="0"/>
-              <a:t>logique pour un meilleur repérage dans le projet complet </a:t>
-            </a:r>
-            <a:endParaRPr lang="fr-FR" sz="1400" dirty="0" smtClean="0"/>
-          </a:p>
-          <a:p>
-            <a:pPr algn="l"/>
-            <a:r>
-              <a:rPr lang="fr-FR" sz="1400" dirty="0"/>
-              <a:t> </a:t>
-            </a:r>
-            <a:r>
-              <a:rPr lang="fr-FR" sz="1400" dirty="0" smtClean="0"/>
-              <a:t>                                   </a:t>
-            </a:r>
-          </a:p>
-          <a:p>
-            <a:pPr algn="l"/>
-            <a:r>
-              <a:rPr lang="fr-FR" sz="1400" dirty="0"/>
-              <a:t> </a:t>
-            </a:r>
-            <a:r>
-              <a:rPr lang="fr-FR" sz="1400" dirty="0" smtClean="0"/>
-              <a:t>                                   · </a:t>
-            </a:r>
-            <a:r>
-              <a:rPr lang="fr-FR" sz="1400" dirty="0"/>
-              <a:t>Le CSS doit appartenir </a:t>
-            </a:r>
-            <a:r>
-              <a:rPr lang="fr-FR" sz="1400" dirty="0" smtClean="0"/>
-              <a:t>respectivement </a:t>
-            </a:r>
-            <a:r>
-              <a:rPr lang="fr-FR" sz="1400" dirty="0"/>
-              <a:t>à un fichier CSS </a:t>
-            </a:r>
-            <a:r>
-              <a:rPr lang="fr-FR" sz="1400" dirty="0"/>
-              <a:t/>
-            </a:r>
-            <a:br>
-              <a:rPr lang="fr-FR" sz="1400" dirty="0"/>
-            </a:br>
-            <a:endParaRPr lang="fr-FR" sz="3000" dirty="0">
-              <a:solidFill>
-                <a:srgbClr val="0162FD"/>
-              </a:solidFill>
-              <a:latin typeface="Roboto" panose="02000000000000000000" pitchFamily="2" charset="0"/>
+            <a:endParaRPr lang="fr-FR" sz="1400" dirty="0">
+              <a:latin typeface="Nunito" panose="02000503030000020003" pitchFamily="2" charset="0"/>
               <a:ea typeface="Roboto" panose="02000000000000000000" pitchFamily="2" charset="0"/>
             </a:endParaRPr>
           </a:p>
           <a:p>
             <a:pPr algn="l"/>
-            <a:endParaRPr lang="fr-FR" sz="3000" dirty="0" smtClean="0">
-              <a:solidFill>
-                <a:srgbClr val="0162FD"/>
-              </a:solidFill>
-              <a:latin typeface="Roboto" panose="02000000000000000000" pitchFamily="2" charset="0"/>
+            <a:endParaRPr lang="fr-FR" sz="1400" dirty="0" smtClean="0">
+              <a:latin typeface="Nunito" panose="02000503030000020003" pitchFamily="2" charset="0"/>
               <a:ea typeface="Roboto" panose="02000000000000000000" pitchFamily="2" charset="0"/>
             </a:endParaRPr>
           </a:p>
           <a:p>
             <a:pPr algn="l"/>
-            <a:endParaRPr lang="fr-FR" dirty="0" smtClean="0"/>
+            <a:r>
+              <a:rPr lang="fr-FR" sz="1500" dirty="0" smtClean="0">
+                <a:latin typeface="Nunito" panose="02000503030000020003" pitchFamily="2" charset="0"/>
+              </a:rPr>
+              <a:t>· Suffit de déclarer les classes qui sont indiqué sur la sélection de l’icône :</a:t>
+            </a:r>
+          </a:p>
+          <a:p>
+            <a:pPr algn="l"/>
+            <a:endParaRPr lang="fr-FR" sz="1500" dirty="0" smtClean="0">
+              <a:latin typeface="Nunito" panose="02000503030000020003" pitchFamily="2" charset="0"/>
+            </a:endParaRPr>
+          </a:p>
+          <a:p>
+            <a:pPr algn="l"/>
+            <a:endParaRPr lang="fr-FR" sz="1500" dirty="0" smtClean="0">
+              <a:latin typeface="Nunito" panose="02000503030000020003" pitchFamily="2" charset="0"/>
+            </a:endParaRPr>
           </a:p>
         </p:txBody>
       </p:sp>
       <p:pic>
         <p:nvPicPr>
-          <p:cNvPr id="5" name="Image 4"/>
+          <p:cNvPr id="2" name="Image 1"/>
           <p:cNvPicPr>
             <a:picLocks noChangeAspect="1"/>
           </p:cNvPicPr>
@@ -3701,8 +4071,8 @@
         </p:blipFill>
         <p:spPr>
           <a:xfrm>
-            <a:off x="1559282" y="3989239"/>
-            <a:ext cx="1334993" cy="1255946"/>
+            <a:off x="1603388" y="2678636"/>
+            <a:ext cx="9001125" cy="276225"/>
           </a:xfrm>
           <a:prstGeom prst="rect">
             <a:avLst/>
@@ -3731,8 +4101,277 @@
         </p:blipFill>
         <p:spPr>
           <a:xfrm>
-            <a:off x="7090910" y="3535011"/>
-            <a:ext cx="3977306" cy="1862252"/>
+            <a:off x="4730112" y="3864706"/>
+            <a:ext cx="2569186" cy="977639"/>
+          </a:xfrm>
+          <a:prstGeom prst="rect">
+            <a:avLst/>
+          </a:prstGeom>
+        </p:spPr>
+      </p:pic>
+    </p:spTree>
+    <p:extLst>
+      <p:ext uri="{BB962C8B-B14F-4D97-AF65-F5344CB8AC3E}">
+        <p14:creationId xmlns:p14="http://schemas.microsoft.com/office/powerpoint/2010/main" val="4025239154"/>
+      </p:ext>
+    </p:extLst>
+  </p:cSld>
+  <p:clrMapOvr>
+    <a:masterClrMapping/>
+  </p:clrMapOvr>
+</p:sld>
+</file>
+
+<file path=ppt/slides/slide6.xml><?xml version="1.0" encoding="utf-8"?>
+<p:sld xmlns:a="http://schemas.openxmlformats.org/drawingml/2006/main" xmlns:r="http://schemas.openxmlformats.org/officeDocument/2006/relationships" xmlns:p="http://schemas.openxmlformats.org/presentationml/2006/main">
+  <p:cSld>
+    <p:spTree>
+      <p:nvGrpSpPr>
+        <p:cNvPr id="1" name=""/>
+        <p:cNvGrpSpPr/>
+        <p:nvPr/>
+      </p:nvGrpSpPr>
+      <p:grpSpPr>
+        <a:xfrm>
+          <a:off x="0" y="0"/>
+          <a:ext cx="0" cy="0"/>
+          <a:chOff x="0" y="0"/>
+          <a:chExt cx="0" cy="0"/>
+        </a:xfrm>
+      </p:grpSpPr>
+      <p:pic>
+        <p:nvPicPr>
+          <p:cNvPr id="3" name="Image 2"/>
+          <p:cNvPicPr>
+            <a:picLocks noChangeAspect="1"/>
+          </p:cNvPicPr>
+          <p:nvPr/>
+        </p:nvPicPr>
+        <p:blipFill>
+          <a:blip r:embed="rId2">
+            <a:extLst>
+              <a:ext uri="{28A0092B-C50C-407E-A947-70E740481C1C}">
+                <a14:useLocalDpi xmlns:a14="http://schemas.microsoft.com/office/drawing/2010/main" val="0"/>
+              </a:ext>
+            </a:extLst>
+          </a:blip>
+          <a:stretch>
+            <a:fillRect/>
+          </a:stretch>
+        </p:blipFill>
+        <p:spPr>
+          <a:xfrm>
+            <a:off x="146641" y="113309"/>
+            <a:ext cx="491115" cy="665919"/>
+          </a:xfrm>
+          <a:prstGeom prst="rect">
+            <a:avLst/>
+          </a:prstGeom>
+        </p:spPr>
+      </p:pic>
+      <p:sp>
+        <p:nvSpPr>
+          <p:cNvPr id="4" name="Sous-titre 1"/>
+          <p:cNvSpPr>
+            <a:spLocks noGrp="1"/>
+          </p:cNvSpPr>
+          <p:nvPr>
+            <p:ph type="subTitle" idx="1"/>
+          </p:nvPr>
+        </p:nvSpPr>
+        <p:spPr>
+          <a:xfrm>
+            <a:off x="1396779" y="1351818"/>
+            <a:ext cx="9862268" cy="4178430"/>
+          </a:xfrm>
+          <a:solidFill>
+            <a:schemeClr val="bg1">
+              <a:lumMod val="95000"/>
+            </a:schemeClr>
+          </a:solidFill>
+        </p:spPr>
+        <p:txBody>
+          <a:bodyPr>
+            <a:normAutofit/>
+          </a:bodyPr>
+          <a:lstStyle/>
+          <a:p>
+            <a:r>
+              <a:rPr lang="fr-FR" sz="3000" dirty="0" smtClean="0">
+                <a:solidFill>
+                  <a:srgbClr val="0162FD"/>
+                </a:solidFill>
+                <a:latin typeface="Roboto" panose="02000000000000000000" pitchFamily="2" charset="0"/>
+                <a:ea typeface="Roboto" panose="02000000000000000000" pitchFamily="2" charset="0"/>
+              </a:rPr>
+              <a:t>Le responsive design :</a:t>
+            </a:r>
+          </a:p>
+          <a:p>
+            <a:pPr algn="l"/>
+            <a:endParaRPr lang="fr-FR" sz="3000" dirty="0">
+              <a:solidFill>
+                <a:srgbClr val="0162FD"/>
+              </a:solidFill>
+              <a:latin typeface="Roboto" panose="02000000000000000000" pitchFamily="2" charset="0"/>
+              <a:ea typeface="Roboto" panose="02000000000000000000" pitchFamily="2" charset="0"/>
+            </a:endParaRPr>
+          </a:p>
+          <a:p>
+            <a:pPr algn="l"/>
+            <a:r>
+              <a:rPr lang="fr-FR" sz="1400" dirty="0" smtClean="0">
+                <a:latin typeface="Nunito" panose="02000503030000020003" pitchFamily="2" charset="0"/>
+                <a:ea typeface="Roboto" panose="02000000000000000000" pitchFamily="2" charset="0"/>
+              </a:rPr>
+              <a:t>· Trouver 4 combinaisons pour rendre le site web compatible sur toutes </a:t>
+            </a:r>
+            <a:r>
+              <a:rPr lang="fr-FR" sz="1400" dirty="0" smtClean="0">
+                <a:latin typeface="Nunito" panose="02000503030000020003" pitchFamily="2" charset="0"/>
+                <a:ea typeface="Roboto" panose="02000000000000000000" pitchFamily="2" charset="0"/>
+              </a:rPr>
+              <a:t>tailles </a:t>
+            </a:r>
+            <a:r>
+              <a:rPr lang="fr-FR" sz="1400" dirty="0" smtClean="0">
+                <a:latin typeface="Nunito" panose="02000503030000020003" pitchFamily="2" charset="0"/>
+                <a:ea typeface="Roboto" panose="02000000000000000000" pitchFamily="2" charset="0"/>
+              </a:rPr>
+              <a:t>d’</a:t>
+            </a:r>
+            <a:r>
+              <a:rPr lang="fr-FR" sz="1400" dirty="0">
+                <a:latin typeface="Nunito" panose="02000503030000020003" pitchFamily="2" charset="0"/>
+                <a:ea typeface="Roboto" panose="02000000000000000000" pitchFamily="2" charset="0"/>
+              </a:rPr>
+              <a:t>é</a:t>
+            </a:r>
+            <a:r>
+              <a:rPr lang="fr-FR" sz="1400" dirty="0" smtClean="0">
+                <a:latin typeface="Nunito" panose="02000503030000020003" pitchFamily="2" charset="0"/>
+                <a:ea typeface="Roboto" panose="02000000000000000000" pitchFamily="2" charset="0"/>
+              </a:rPr>
+              <a:t>cran</a:t>
+            </a:r>
+          </a:p>
+          <a:p>
+            <a:pPr algn="l"/>
+            <a:r>
+              <a:rPr lang="fr-FR" sz="1400" dirty="0">
+                <a:latin typeface="Nunito" panose="02000503030000020003" pitchFamily="2" charset="0"/>
+                <a:ea typeface="Roboto" panose="02000000000000000000" pitchFamily="2" charset="0"/>
+              </a:rPr>
+              <a:t>· Dimension pour les écrans de </a:t>
+            </a:r>
+            <a:r>
+              <a:rPr lang="fr-FR" sz="1400" dirty="0" smtClean="0">
+                <a:latin typeface="Nunito" panose="02000503030000020003" pitchFamily="2" charset="0"/>
+                <a:ea typeface="Roboto" panose="02000000000000000000" pitchFamily="2" charset="0"/>
+              </a:rPr>
+              <a:t>téléphone :</a:t>
+            </a:r>
+            <a:endParaRPr lang="fr-FR" sz="1400" dirty="0">
+              <a:latin typeface="Nunito" panose="02000503030000020003" pitchFamily="2" charset="0"/>
+              <a:ea typeface="Roboto" panose="02000000000000000000" pitchFamily="2" charset="0"/>
+            </a:endParaRPr>
+          </a:p>
+          <a:p>
+            <a:pPr algn="l"/>
+            <a:r>
+              <a:rPr lang="fr-FR" sz="1400" dirty="0">
+                <a:latin typeface="Nunito" panose="02000503030000020003" pitchFamily="2" charset="0"/>
+                <a:ea typeface="Roboto" panose="02000000000000000000" pitchFamily="2" charset="0"/>
+              </a:rPr>
+              <a:t>· Dimension pour les écrans de </a:t>
+            </a:r>
+            <a:r>
+              <a:rPr lang="fr-FR" sz="1400" dirty="0" smtClean="0">
+                <a:latin typeface="Nunito" panose="02000503030000020003" pitchFamily="2" charset="0"/>
+                <a:ea typeface="Roboto" panose="02000000000000000000" pitchFamily="2" charset="0"/>
+              </a:rPr>
+              <a:t>téléphone en format paysage : </a:t>
+            </a:r>
+          </a:p>
+          <a:p>
+            <a:pPr algn="l"/>
+            <a:endParaRPr lang="fr-FR" sz="1400" dirty="0">
+              <a:latin typeface="Nunito" panose="02000503030000020003" pitchFamily="2" charset="0"/>
+              <a:ea typeface="Roboto" panose="02000000000000000000" pitchFamily="2" charset="0"/>
+            </a:endParaRPr>
+          </a:p>
+          <a:p>
+            <a:pPr algn="l"/>
+            <a:r>
+              <a:rPr lang="fr-FR" sz="1400" dirty="0">
+                <a:latin typeface="Nunito" panose="02000503030000020003" pitchFamily="2" charset="0"/>
+                <a:ea typeface="Roboto" panose="02000000000000000000" pitchFamily="2" charset="0"/>
+              </a:rPr>
+              <a:t>· Dimension pour les </a:t>
+            </a:r>
+            <a:r>
+              <a:rPr lang="fr-FR" sz="1400" dirty="0" smtClean="0">
+                <a:latin typeface="Nunito" panose="02000503030000020003" pitchFamily="2" charset="0"/>
+                <a:ea typeface="Roboto" panose="02000000000000000000" pitchFamily="2" charset="0"/>
+              </a:rPr>
+              <a:t>pad :</a:t>
+            </a:r>
+            <a:endParaRPr lang="fr-FR" sz="1400" dirty="0">
+              <a:latin typeface="Nunito" panose="02000503030000020003" pitchFamily="2" charset="0"/>
+              <a:ea typeface="Roboto" panose="02000000000000000000" pitchFamily="2" charset="0"/>
+            </a:endParaRPr>
+          </a:p>
+          <a:p>
+            <a:pPr algn="l"/>
+            <a:r>
+              <a:rPr lang="fr-FR" sz="1400" dirty="0">
+                <a:latin typeface="Nunito" panose="02000503030000020003" pitchFamily="2" charset="0"/>
+                <a:ea typeface="Roboto" panose="02000000000000000000" pitchFamily="2" charset="0"/>
+              </a:rPr>
+              <a:t>· Dimension pour les </a:t>
+            </a:r>
+            <a:r>
+              <a:rPr lang="fr-FR" sz="1400" dirty="0" smtClean="0">
+                <a:latin typeface="Nunito" panose="02000503030000020003" pitchFamily="2" charset="0"/>
+                <a:ea typeface="Roboto" panose="02000000000000000000" pitchFamily="2" charset="0"/>
+              </a:rPr>
+              <a:t>pad en format paysage et plus grand encore :</a:t>
+            </a:r>
+            <a:endParaRPr lang="fr-FR" sz="1400" dirty="0">
+              <a:latin typeface="Nunito" panose="02000503030000020003" pitchFamily="2" charset="0"/>
+              <a:ea typeface="Roboto" panose="02000000000000000000" pitchFamily="2" charset="0"/>
+            </a:endParaRPr>
+          </a:p>
+          <a:p>
+            <a:pPr algn="l"/>
+            <a:endParaRPr lang="fr-FR" dirty="0" smtClean="0"/>
+          </a:p>
+        </p:txBody>
+      </p:sp>
+      <p:pic>
+        <p:nvPicPr>
+          <p:cNvPr id="2" name="Image 1"/>
+          <p:cNvPicPr>
+            <a:picLocks noChangeAspect="1"/>
+          </p:cNvPicPr>
+          <p:nvPr/>
+        </p:nvPicPr>
+        <p:blipFill>
+          <a:blip r:embed="rId3">
+            <a:extLst>
+              <a:ext uri="{28A0092B-C50C-407E-A947-70E740481C1C}">
+                <a14:useLocalDpi xmlns:a14="http://schemas.microsoft.com/office/drawing/2010/main" val="0"/>
+              </a:ext>
+            </a:extLst>
+          </a:blip>
+          <a:stretch>
+            <a:fillRect/>
+          </a:stretch>
+        </p:blipFill>
+        <p:spPr>
+          <a:xfrm>
+            <a:off x="5693134" y="2738113"/>
+            <a:ext cx="4057650" cy="272677"/>
           </a:xfrm>
           <a:prstGeom prst="rect">
             <a:avLst/>
@@ -3741,7 +4380,37 @@
       </p:pic>
       <p:pic>
         <p:nvPicPr>
-          <p:cNvPr id="7" name="Image 6"/>
+          <p:cNvPr id="9" name="Image 8"/>
+          <p:cNvPicPr>
+            <a:picLocks noChangeAspect="1"/>
+          </p:cNvPicPr>
+          <p:nvPr/>
+        </p:nvPicPr>
+        <p:blipFill>
+          <a:blip r:embed="rId4">
+            <a:extLst>
+              <a:ext uri="{28A0092B-C50C-407E-A947-70E740481C1C}">
+                <a14:useLocalDpi xmlns:a14="http://schemas.microsoft.com/office/drawing/2010/main" val="0"/>
+              </a:ext>
+            </a:extLst>
+          </a:blip>
+          <a:stretch>
+            <a:fillRect/>
+          </a:stretch>
+        </p:blipFill>
+        <p:spPr>
+          <a:xfrm>
+            <a:off x="4165158" y="3624264"/>
+            <a:ext cx="4105441" cy="323699"/>
+          </a:xfrm>
+          <a:prstGeom prst="rect">
+            <a:avLst/>
+          </a:prstGeom>
+        </p:spPr>
+      </p:pic>
+      <p:pic>
+        <p:nvPicPr>
+          <p:cNvPr id="10" name="Image 9"/>
           <p:cNvPicPr>
             <a:picLocks noChangeAspect="1"/>
           </p:cNvPicPr>
@@ -3761,8 +4430,8 @@
         </p:blipFill>
         <p:spPr>
           <a:xfrm>
-            <a:off x="1559282" y="1919456"/>
-            <a:ext cx="6566951" cy="1047918"/>
+            <a:off x="5206862" y="4468986"/>
+            <a:ext cx="4057650" cy="333601"/>
           </a:xfrm>
           <a:prstGeom prst="rect">
             <a:avLst/>
@@ -3771,7 +4440,7 @@
       </p:pic>
       <p:pic>
         <p:nvPicPr>
-          <p:cNvPr id="8" name="Image 7"/>
+          <p:cNvPr id="11" name="Image 10"/>
           <p:cNvPicPr>
             <a:picLocks noChangeAspect="1"/>
           </p:cNvPicPr>
@@ -3791,8 +4460,8 @@
         </p:blipFill>
         <p:spPr>
           <a:xfrm>
-            <a:off x="6017813" y="3180693"/>
-            <a:ext cx="4531166" cy="266050"/>
+            <a:off x="6893782" y="3061998"/>
+            <a:ext cx="4094922" cy="323783"/>
           </a:xfrm>
           <a:prstGeom prst="rect">
             <a:avLst/>
@@ -3812,7 +4481,205 @@
 </p:sld>
 </file>
 
-<file path=ppt/slides/slide5.xml><?xml version="1.0" encoding="utf-8"?>
+<file path=ppt/slides/slide7.xml><?xml version="1.0" encoding="utf-8"?>
+<p:sld xmlns:a="http://schemas.openxmlformats.org/drawingml/2006/main" xmlns:r="http://schemas.openxmlformats.org/officeDocument/2006/relationships" xmlns:p="http://schemas.openxmlformats.org/presentationml/2006/main">
+  <p:cSld>
+    <p:spTree>
+      <p:nvGrpSpPr>
+        <p:cNvPr id="1" name=""/>
+        <p:cNvGrpSpPr/>
+        <p:nvPr/>
+      </p:nvGrpSpPr>
+      <p:grpSpPr>
+        <a:xfrm>
+          <a:off x="0" y="0"/>
+          <a:ext cx="0" cy="0"/>
+          <a:chOff x="0" y="0"/>
+          <a:chExt cx="0" cy="0"/>
+        </a:xfrm>
+      </p:grpSpPr>
+      <p:pic>
+        <p:nvPicPr>
+          <p:cNvPr id="3" name="Image 2"/>
+          <p:cNvPicPr>
+            <a:picLocks noChangeAspect="1"/>
+          </p:cNvPicPr>
+          <p:nvPr/>
+        </p:nvPicPr>
+        <p:blipFill>
+          <a:blip r:embed="rId2">
+            <a:extLst>
+              <a:ext uri="{28A0092B-C50C-407E-A947-70E740481C1C}">
+                <a14:useLocalDpi xmlns:a14="http://schemas.microsoft.com/office/drawing/2010/main" val="0"/>
+              </a:ext>
+            </a:extLst>
+          </a:blip>
+          <a:stretch>
+            <a:fillRect/>
+          </a:stretch>
+        </p:blipFill>
+        <p:spPr>
+          <a:xfrm>
+            <a:off x="146641" y="113309"/>
+            <a:ext cx="491115" cy="665919"/>
+          </a:xfrm>
+          <a:prstGeom prst="rect">
+            <a:avLst/>
+          </a:prstGeom>
+        </p:spPr>
+      </p:pic>
+      <p:sp>
+        <p:nvSpPr>
+          <p:cNvPr id="4" name="Sous-titre 1"/>
+          <p:cNvSpPr>
+            <a:spLocks noGrp="1"/>
+          </p:cNvSpPr>
+          <p:nvPr>
+            <p:ph type="subTitle" idx="1"/>
+          </p:nvPr>
+        </p:nvSpPr>
+        <p:spPr>
+          <a:xfrm>
+            <a:off x="1428585" y="1351817"/>
+            <a:ext cx="9862268" cy="4722980"/>
+          </a:xfrm>
+          <a:solidFill>
+            <a:schemeClr val="bg1">
+              <a:lumMod val="95000"/>
+            </a:schemeClr>
+          </a:solidFill>
+        </p:spPr>
+        <p:txBody>
+          <a:bodyPr>
+            <a:normAutofit/>
+          </a:bodyPr>
+          <a:lstStyle/>
+          <a:p>
+            <a:r>
+              <a:rPr lang="fr-FR" sz="3000" dirty="0" smtClean="0">
+                <a:solidFill>
+                  <a:srgbClr val="0162FD"/>
+                </a:solidFill>
+                <a:latin typeface="Roboto" panose="02000000000000000000" pitchFamily="2" charset="0"/>
+                <a:ea typeface="Roboto" panose="02000000000000000000" pitchFamily="2" charset="0"/>
+              </a:rPr>
+              <a:t>Cross plateforme :</a:t>
+            </a:r>
+          </a:p>
+          <a:p>
+            <a:pPr algn="l"/>
+            <a:endParaRPr lang="fr-FR" sz="800" dirty="0">
+              <a:solidFill>
+                <a:srgbClr val="0162FD"/>
+              </a:solidFill>
+              <a:latin typeface="Roboto" panose="02000000000000000000" pitchFamily="2" charset="0"/>
+              <a:ea typeface="Roboto" panose="02000000000000000000" pitchFamily="2" charset="0"/>
+            </a:endParaRPr>
+          </a:p>
+          <a:p>
+            <a:pPr algn="l"/>
+            <a:r>
+              <a:rPr lang="fr-FR" sz="1400" dirty="0" smtClean="0">
+                <a:latin typeface="Nunito" panose="02000503030000020003" pitchFamily="2" charset="0"/>
+                <a:ea typeface="Roboto" panose="02000000000000000000" pitchFamily="2" charset="0"/>
+              </a:rPr>
+              <a:t>· Utilisé le site </a:t>
+            </a:r>
+            <a:r>
+              <a:rPr lang="fr-FR" sz="1400" dirty="0">
+                <a:latin typeface="Nunito" panose="02000503030000020003" pitchFamily="2" charset="0"/>
+                <a:ea typeface="Roboto" panose="02000000000000000000" pitchFamily="2" charset="0"/>
+              </a:rPr>
+              <a:t>web </a:t>
+            </a:r>
+            <a:r>
+              <a:rPr lang="fr-FR" sz="1400" dirty="0">
+                <a:latin typeface="Nunito" panose="02000503030000020003" pitchFamily="2" charset="0"/>
+                <a:ea typeface="Roboto" panose="02000000000000000000" pitchFamily="2" charset="0"/>
+                <a:hlinkClick r:id="rId3"/>
+              </a:rPr>
+              <a:t>https://autoprefixer.github.io</a:t>
+            </a:r>
+            <a:r>
+              <a:rPr lang="fr-FR" sz="1400" dirty="0" smtClean="0">
+                <a:latin typeface="Nunito" panose="02000503030000020003" pitchFamily="2" charset="0"/>
+                <a:ea typeface="Roboto" panose="02000000000000000000" pitchFamily="2" charset="0"/>
+                <a:hlinkClick r:id="rId3"/>
+              </a:rPr>
+              <a:t>/</a:t>
+            </a:r>
+            <a:r>
+              <a:rPr lang="fr-FR" sz="1400" dirty="0" smtClean="0">
+                <a:latin typeface="Nunito" panose="02000503030000020003" pitchFamily="2" charset="0"/>
+                <a:ea typeface="Roboto" panose="02000000000000000000" pitchFamily="2" charset="0"/>
+              </a:rPr>
+              <a:t> qui automatise la compatibilité CSS pour tout type de navigateur :</a:t>
+            </a:r>
+          </a:p>
+          <a:p>
+            <a:pPr algn="l"/>
+            <a:endParaRPr lang="fr-FR" sz="1400" dirty="0">
+              <a:latin typeface="Nunito" panose="02000503030000020003" pitchFamily="2" charset="0"/>
+              <a:ea typeface="Roboto" panose="02000000000000000000" pitchFamily="2" charset="0"/>
+            </a:endParaRPr>
+          </a:p>
+          <a:p>
+            <a:pPr algn="l"/>
+            <a:endParaRPr lang="fr-FR" sz="1400" dirty="0" smtClean="0">
+              <a:latin typeface="Nunito" panose="02000503030000020003" pitchFamily="2" charset="0"/>
+              <a:ea typeface="Roboto" panose="02000000000000000000" pitchFamily="2" charset="0"/>
+            </a:endParaRPr>
+          </a:p>
+          <a:p>
+            <a:pPr algn="l"/>
+            <a:endParaRPr lang="fr-FR" dirty="0" smtClean="0"/>
+          </a:p>
+        </p:txBody>
+      </p:sp>
+      <p:pic>
+        <p:nvPicPr>
+          <p:cNvPr id="5" name="Image 4"/>
+          <p:cNvPicPr>
+            <a:picLocks noChangeAspect="1"/>
+          </p:cNvPicPr>
+          <p:nvPr/>
+        </p:nvPicPr>
+        <p:blipFill>
+          <a:blip r:embed="rId4">
+            <a:extLst>
+              <a:ext uri="{28A0092B-C50C-407E-A947-70E740481C1C}">
+                <a14:useLocalDpi xmlns:a14="http://schemas.microsoft.com/office/drawing/2010/main" val="0"/>
+              </a:ext>
+            </a:extLst>
+          </a:blip>
+          <a:stretch>
+            <a:fillRect/>
+          </a:stretch>
+        </p:blipFill>
+        <p:spPr>
+          <a:xfrm>
+            <a:off x="2870421" y="2577179"/>
+            <a:ext cx="6634168" cy="3112095"/>
+          </a:xfrm>
+          <a:prstGeom prst="rect">
+            <a:avLst/>
+          </a:prstGeom>
+        </p:spPr>
+      </p:pic>
+    </p:spTree>
+    <p:extLst>
+      <p:ext uri="{BB962C8B-B14F-4D97-AF65-F5344CB8AC3E}">
+        <p14:creationId xmlns:p14="http://schemas.microsoft.com/office/powerpoint/2010/main" val="140192265"/>
+      </p:ext>
+    </p:extLst>
+  </p:cSld>
+  <p:clrMapOvr>
+    <a:masterClrMapping/>
+  </p:clrMapOvr>
+</p:sld>
+</file>
+
+<file path=ppt/slides/slide8.xml><?xml version="1.0" encoding="utf-8"?>
 <p:sld xmlns:a="http://schemas.openxmlformats.org/drawingml/2006/main" xmlns:r="http://schemas.openxmlformats.org/officeDocument/2006/relationships" xmlns:p="http://schemas.openxmlformats.org/presentationml/2006/main">
   <p:cSld>
     <p:spTree>
@@ -4110,38 +4977,8 @@
         </p:blipFill>
         <p:spPr>
           <a:xfrm>
-            <a:off x="1396779" y="1743305"/>
+            <a:off x="1455753" y="1754143"/>
             <a:ext cx="2658301" cy="3343655"/>
-          </a:xfrm>
-          <a:prstGeom prst="rect">
-            <a:avLst/>
-          </a:prstGeom>
-        </p:spPr>
-      </p:pic>
-      <p:pic>
-        <p:nvPicPr>
-          <p:cNvPr id="6" name="Image 5"/>
-          <p:cNvPicPr>
-            <a:picLocks noChangeAspect="1"/>
-          </p:cNvPicPr>
-          <p:nvPr/>
-        </p:nvPicPr>
-        <p:blipFill>
-          <a:blip r:embed="rId5">
-            <a:extLst>
-              <a:ext uri="{28A0092B-C50C-407E-A947-70E740481C1C}">
-                <a14:useLocalDpi xmlns:a14="http://schemas.microsoft.com/office/drawing/2010/main" val="0"/>
-              </a:ext>
-            </a:extLst>
-          </a:blip>
-          <a:stretch>
-            <a:fillRect/>
-          </a:stretch>
-        </p:blipFill>
-        <p:spPr>
-          <a:xfrm>
-            <a:off x="10079812" y="1351818"/>
-            <a:ext cx="1179235" cy="4126631"/>
           </a:xfrm>
           <a:prstGeom prst="rect">
             <a:avLst/>
@@ -4161,530 +4998,7 @@
 </p:sld>
 </file>
 
-<file path=ppt/slides/slide6.xml><?xml version="1.0" encoding="utf-8"?>
-<p:sld xmlns:a="http://schemas.openxmlformats.org/drawingml/2006/main" xmlns:r="http://schemas.openxmlformats.org/officeDocument/2006/relationships" xmlns:p="http://schemas.openxmlformats.org/presentationml/2006/main">
-  <p:cSld>
-    <p:spTree>
-      <p:nvGrpSpPr>
-        <p:cNvPr id="1" name=""/>
-        <p:cNvGrpSpPr/>
-        <p:nvPr/>
-      </p:nvGrpSpPr>
-      <p:grpSpPr>
-        <a:xfrm>
-          <a:off x="0" y="0"/>
-          <a:ext cx="0" cy="0"/>
-          <a:chOff x="0" y="0"/>
-          <a:chExt cx="0" cy="0"/>
-        </a:xfrm>
-      </p:grpSpPr>
-      <p:sp>
-        <p:nvSpPr>
-          <p:cNvPr id="2" name="Sous-titre 1"/>
-          <p:cNvSpPr>
-            <a:spLocks noGrp="1"/>
-          </p:cNvSpPr>
-          <p:nvPr>
-            <p:ph type="subTitle" idx="1"/>
-          </p:nvPr>
-        </p:nvSpPr>
-        <p:spPr>
-          <a:xfrm>
-            <a:off x="1396779" y="1351818"/>
-            <a:ext cx="9862268" cy="4126631"/>
-          </a:xfrm>
-          <a:solidFill>
-            <a:schemeClr val="bg1">
-              <a:lumMod val="95000"/>
-            </a:schemeClr>
-          </a:solidFill>
-        </p:spPr>
-        <p:txBody>
-          <a:bodyPr>
-            <a:normAutofit/>
-          </a:bodyPr>
-          <a:lstStyle/>
-          <a:p>
-            <a:r>
-              <a:rPr lang="fr-FR" sz="3000" dirty="0" smtClean="0">
-                <a:solidFill>
-                  <a:srgbClr val="0162FD"/>
-                </a:solidFill>
-                <a:latin typeface="Roboto" panose="02000000000000000000" pitchFamily="2" charset="0"/>
-                <a:ea typeface="Roboto" panose="02000000000000000000" pitchFamily="2" charset="0"/>
-              </a:rPr>
-              <a:t>Un CSS générique ?</a:t>
-            </a:r>
-          </a:p>
-          <a:p>
-            <a:endParaRPr lang="fr-FR" dirty="0" smtClean="0"/>
-          </a:p>
-          <a:p>
-            <a:r>
-              <a:rPr lang="fr-FR" sz="1250" dirty="0" smtClean="0">
-                <a:latin typeface="Nunito" panose="02000503030000020003" pitchFamily="2" charset="0"/>
-              </a:rPr>
-              <a:t>                 · Utiliser un CSS générique pour la structure non responsive</a:t>
-            </a:r>
-          </a:p>
-          <a:p>
-            <a:r>
-              <a:rPr lang="fr-FR" sz="1250" dirty="0" smtClean="0">
-                <a:latin typeface="Nunito" panose="02000503030000020003" pitchFamily="2" charset="0"/>
-              </a:rPr>
-              <a:t>                 Du site web, telle que le CSS pour optimiser l’écriture du code</a:t>
-            </a:r>
-          </a:p>
-          <a:p>
-            <a:endParaRPr lang="fr-FR" sz="1250" dirty="0" smtClean="0">
-              <a:latin typeface="Nunito" panose="02000503030000020003" pitchFamily="2" charset="0"/>
-            </a:endParaRPr>
-          </a:p>
-          <a:p>
-            <a:endParaRPr lang="fr-FR" sz="1250" dirty="0" smtClean="0">
-              <a:latin typeface="Nunito" panose="02000503030000020003" pitchFamily="2" charset="0"/>
-            </a:endParaRPr>
-          </a:p>
-          <a:p>
-            <a:r>
-              <a:rPr lang="fr-FR" sz="1250" dirty="0" smtClean="0">
-                <a:latin typeface="Nunito" panose="02000503030000020003" pitchFamily="2" charset="0"/>
-              </a:rPr>
-              <a:t>· Et aussi optimiser sur des </a:t>
-            </a:r>
-          </a:p>
-          <a:p>
-            <a:r>
-              <a:rPr lang="fr-FR" sz="1250" dirty="0" smtClean="0">
-                <a:latin typeface="Nunito" panose="02000503030000020003" pitchFamily="2" charset="0"/>
-              </a:rPr>
-              <a:t>automatisations des balises </a:t>
-            </a:r>
-          </a:p>
-          <a:p>
-            <a:r>
-              <a:rPr lang="fr-FR" sz="1250" dirty="0" smtClean="0">
-                <a:latin typeface="Nunito" panose="02000503030000020003" pitchFamily="2" charset="0"/>
-              </a:rPr>
-              <a:t>telle que le Font qui est ici </a:t>
-            </a:r>
-          </a:p>
-          <a:p>
-            <a:r>
-              <a:rPr lang="fr-FR" sz="1250" dirty="0" smtClean="0">
-                <a:latin typeface="Nunito" panose="02000503030000020003" pitchFamily="2" charset="0"/>
-              </a:rPr>
-              <a:t>« </a:t>
-            </a:r>
-            <a:r>
-              <a:rPr lang="fr-FR" sz="1250" dirty="0" err="1" smtClean="0">
-                <a:latin typeface="Nunito" panose="02000503030000020003" pitchFamily="2" charset="0"/>
-              </a:rPr>
-              <a:t>Raleway</a:t>
-            </a:r>
-            <a:r>
-              <a:rPr lang="fr-FR" sz="1250" dirty="0" smtClean="0">
-                <a:latin typeface="Nunito" panose="02000503030000020003" pitchFamily="2" charset="0"/>
-              </a:rPr>
-              <a:t> » pour tout le site</a:t>
-            </a:r>
-          </a:p>
-          <a:p>
-            <a:endParaRPr lang="fr-FR" sz="1200" dirty="0" smtClean="0">
-              <a:latin typeface="Nunito" panose="02000503030000020003" pitchFamily="2" charset="0"/>
-            </a:endParaRPr>
-          </a:p>
-        </p:txBody>
-      </p:sp>
-      <p:pic>
-        <p:nvPicPr>
-          <p:cNvPr id="5" name="Image 4"/>
-          <p:cNvPicPr>
-            <a:picLocks noChangeAspect="1"/>
-          </p:cNvPicPr>
-          <p:nvPr/>
-        </p:nvPicPr>
-        <p:blipFill>
-          <a:blip r:embed="rId2">
-            <a:extLst>
-              <a:ext uri="{28A0092B-C50C-407E-A947-70E740481C1C}">
-                <a14:useLocalDpi xmlns:a14="http://schemas.microsoft.com/office/drawing/2010/main" val="0"/>
-              </a:ext>
-            </a:extLst>
-          </a:blip>
-          <a:stretch>
-            <a:fillRect/>
-          </a:stretch>
-        </p:blipFill>
-        <p:spPr>
-          <a:xfrm>
-            <a:off x="146641" y="113309"/>
-            <a:ext cx="491115" cy="665919"/>
-          </a:xfrm>
-          <a:prstGeom prst="rect">
-            <a:avLst/>
-          </a:prstGeom>
-        </p:spPr>
-      </p:pic>
-      <p:pic>
-        <p:nvPicPr>
-          <p:cNvPr id="7" name="Image 6"/>
-          <p:cNvPicPr>
-            <a:picLocks noChangeAspect="1"/>
-          </p:cNvPicPr>
-          <p:nvPr/>
-        </p:nvPicPr>
-        <p:blipFill>
-          <a:blip r:embed="rId3">
-            <a:extLst>
-              <a:ext uri="{28A0092B-C50C-407E-A947-70E740481C1C}">
-                <a14:useLocalDpi xmlns:a14="http://schemas.microsoft.com/office/drawing/2010/main" val="0"/>
-              </a:ext>
-            </a:extLst>
-          </a:blip>
-          <a:stretch>
-            <a:fillRect/>
-          </a:stretch>
-        </p:blipFill>
-        <p:spPr>
-          <a:xfrm>
-            <a:off x="7666606" y="3381051"/>
-            <a:ext cx="3417511" cy="1699832"/>
-          </a:xfrm>
-          <a:prstGeom prst="rect">
-            <a:avLst/>
-          </a:prstGeom>
-        </p:spPr>
-      </p:pic>
-      <p:pic>
-        <p:nvPicPr>
-          <p:cNvPr id="8" name="Image 7"/>
-          <p:cNvPicPr>
-            <a:picLocks noChangeAspect="1"/>
-          </p:cNvPicPr>
-          <p:nvPr/>
-        </p:nvPicPr>
-        <p:blipFill>
-          <a:blip r:embed="rId4">
-            <a:extLst>
-              <a:ext uri="{28A0092B-C50C-407E-A947-70E740481C1C}">
-                <a14:useLocalDpi xmlns:a14="http://schemas.microsoft.com/office/drawing/2010/main" val="0"/>
-              </a:ext>
-            </a:extLst>
-          </a:blip>
-          <a:stretch>
-            <a:fillRect/>
-          </a:stretch>
-        </p:blipFill>
-        <p:spPr>
-          <a:xfrm>
-            <a:off x="1624636" y="1620966"/>
-            <a:ext cx="2237710" cy="3520171"/>
-          </a:xfrm>
-          <a:prstGeom prst="rect">
-            <a:avLst/>
-          </a:prstGeom>
-        </p:spPr>
-      </p:pic>
-      <p:pic>
-        <p:nvPicPr>
-          <p:cNvPr id="10" name="Image 9"/>
-          <p:cNvPicPr>
-            <a:picLocks noChangeAspect="1"/>
-          </p:cNvPicPr>
-          <p:nvPr/>
-        </p:nvPicPr>
-        <p:blipFill>
-          <a:blip r:embed="rId5">
-            <a:extLst>
-              <a:ext uri="{28A0092B-C50C-407E-A947-70E740481C1C}">
-                <a14:useLocalDpi xmlns:a14="http://schemas.microsoft.com/office/drawing/2010/main" val="0"/>
-              </a:ext>
-            </a:extLst>
-          </a:blip>
-          <a:stretch>
-            <a:fillRect/>
-          </a:stretch>
-        </p:blipFill>
-        <p:spPr>
-          <a:xfrm>
-            <a:off x="4499113" y="2917672"/>
-            <a:ext cx="4531166" cy="266050"/>
-          </a:xfrm>
-          <a:prstGeom prst="rect">
-            <a:avLst/>
-          </a:prstGeom>
-        </p:spPr>
-      </p:pic>
-    </p:spTree>
-    <p:extLst>
-      <p:ext uri="{BB962C8B-B14F-4D97-AF65-F5344CB8AC3E}">
-        <p14:creationId xmlns:p14="http://schemas.microsoft.com/office/powerpoint/2010/main" val="870887834"/>
-      </p:ext>
-    </p:extLst>
-  </p:cSld>
-  <p:clrMapOvr>
-    <a:masterClrMapping/>
-  </p:clrMapOvr>
-</p:sld>
-</file>
-
-<file path=ppt/slides/slide7.xml><?xml version="1.0" encoding="utf-8"?>
-<p:sld xmlns:a="http://schemas.openxmlformats.org/drawingml/2006/main" xmlns:r="http://schemas.openxmlformats.org/officeDocument/2006/relationships" xmlns:p="http://schemas.openxmlformats.org/presentationml/2006/main">
-  <p:cSld>
-    <p:spTree>
-      <p:nvGrpSpPr>
-        <p:cNvPr id="1" name=""/>
-        <p:cNvGrpSpPr/>
-        <p:nvPr/>
-      </p:nvGrpSpPr>
-      <p:grpSpPr>
-        <a:xfrm>
-          <a:off x="0" y="0"/>
-          <a:ext cx="0" cy="0"/>
-          <a:chOff x="0" y="0"/>
-          <a:chExt cx="0" cy="0"/>
-        </a:xfrm>
-      </p:grpSpPr>
-      <p:sp>
-        <p:nvSpPr>
-          <p:cNvPr id="2" name="Sous-titre 1"/>
-          <p:cNvSpPr>
-            <a:spLocks noGrp="1"/>
-          </p:cNvSpPr>
-          <p:nvPr>
-            <p:ph type="subTitle" idx="1"/>
-          </p:nvPr>
-        </p:nvSpPr>
-        <p:spPr>
-          <a:xfrm>
-            <a:off x="1396779" y="1351818"/>
-            <a:ext cx="9862268" cy="4126631"/>
-          </a:xfrm>
-          <a:solidFill>
-            <a:schemeClr val="bg1">
-              <a:lumMod val="95000"/>
-            </a:schemeClr>
-          </a:solidFill>
-        </p:spPr>
-        <p:txBody>
-          <a:bodyPr>
-            <a:normAutofit/>
-          </a:bodyPr>
-          <a:lstStyle/>
-          <a:p>
-            <a:r>
-              <a:rPr lang="fr-FR" sz="3000" dirty="0" smtClean="0">
-                <a:solidFill>
-                  <a:srgbClr val="0162FD"/>
-                </a:solidFill>
-                <a:latin typeface="Roboto" panose="02000000000000000000" pitchFamily="2" charset="0"/>
-                <a:ea typeface="Roboto" panose="02000000000000000000" pitchFamily="2" charset="0"/>
-              </a:rPr>
-              <a:t>Arborescence </a:t>
-            </a:r>
-          </a:p>
-          <a:p>
-            <a:endParaRPr lang="fr-FR" dirty="0"/>
-          </a:p>
-          <a:p>
-            <a:endParaRPr lang="fr-FR" dirty="0" smtClean="0"/>
-          </a:p>
-          <a:p>
-            <a:endParaRPr lang="fr-FR" dirty="0" smtClean="0"/>
-          </a:p>
-          <a:p>
-            <a:r>
-              <a:rPr lang="fr-FR" sz="1400" dirty="0">
-                <a:latin typeface="Nunito" panose="02000503030000020003" pitchFamily="2" charset="0"/>
-              </a:rPr>
-              <a:t>· En vue d’une probable évolution </a:t>
-            </a:r>
-            <a:endParaRPr lang="fr-FR" sz="1400" dirty="0" smtClean="0">
-              <a:latin typeface="Nunito" panose="02000503030000020003" pitchFamily="2" charset="0"/>
-            </a:endParaRPr>
-          </a:p>
-          <a:p>
-            <a:r>
-              <a:rPr lang="fr-FR" sz="1400" dirty="0" smtClean="0">
-                <a:latin typeface="Nunito" panose="02000503030000020003" pitchFamily="2" charset="0"/>
-              </a:rPr>
-              <a:t>du </a:t>
-            </a:r>
-            <a:r>
-              <a:rPr lang="fr-FR" sz="1400" dirty="0">
-                <a:latin typeface="Nunito" panose="02000503030000020003" pitchFamily="2" charset="0"/>
-              </a:rPr>
-              <a:t>site Il me semble important </a:t>
-            </a:r>
-            <a:r>
-              <a:rPr lang="fr-FR" sz="1400" dirty="0" smtClean="0">
-                <a:latin typeface="Nunito" panose="02000503030000020003" pitchFamily="2" charset="0"/>
-              </a:rPr>
-              <a:t>d’adopter </a:t>
-            </a:r>
-            <a:r>
-              <a:rPr lang="fr-FR" sz="1400" dirty="0">
-                <a:latin typeface="Nunito" panose="02000503030000020003" pitchFamily="2" charset="0"/>
-              </a:rPr>
-              <a:t>une arborescence </a:t>
-            </a:r>
-            <a:endParaRPr lang="fr-FR" sz="1400" dirty="0" smtClean="0">
-              <a:latin typeface="Nunito" panose="02000503030000020003" pitchFamily="2" charset="0"/>
-            </a:endParaRPr>
-          </a:p>
-          <a:p>
-            <a:r>
-              <a:rPr lang="fr-FR" sz="1400" dirty="0" smtClean="0">
-                <a:latin typeface="Nunito" panose="02000503030000020003" pitchFamily="2" charset="0"/>
-              </a:rPr>
-              <a:t>structurée </a:t>
-            </a:r>
-            <a:r>
-              <a:rPr lang="fr-FR" sz="1400" dirty="0">
-                <a:latin typeface="Nunito" panose="02000503030000020003" pitchFamily="2" charset="0"/>
-              </a:rPr>
-              <a:t>afin de correspondre aux différents langage et les </a:t>
-            </a:r>
-            <a:endParaRPr lang="fr-FR" sz="1400" dirty="0" smtClean="0">
-              <a:latin typeface="Nunito" panose="02000503030000020003" pitchFamily="2" charset="0"/>
-            </a:endParaRPr>
-          </a:p>
-          <a:p>
-            <a:r>
-              <a:rPr lang="fr-FR" sz="1400" dirty="0" smtClean="0">
-                <a:latin typeface="Nunito" panose="02000503030000020003" pitchFamily="2" charset="0"/>
-              </a:rPr>
-              <a:t>différentes </a:t>
-            </a:r>
-            <a:r>
-              <a:rPr lang="fr-FR" sz="1400" dirty="0">
-                <a:latin typeface="Nunito" panose="02000503030000020003" pitchFamily="2" charset="0"/>
-              </a:rPr>
-              <a:t>normes demandée pour le déploiement sur un serveur autre qu’un simple serveur web </a:t>
-            </a:r>
-            <a:r>
-              <a:rPr lang="fr-FR" sz="1400" dirty="0"/>
-              <a:t/>
-            </a:r>
-            <a:br>
-              <a:rPr lang="fr-FR" sz="1400" dirty="0"/>
-            </a:br>
-            <a:endParaRPr lang="fr-FR" sz="1250" dirty="0" smtClean="0">
-              <a:latin typeface="Nunito" panose="02000503030000020003" pitchFamily="2" charset="0"/>
-            </a:endParaRPr>
-          </a:p>
-          <a:p>
-            <a:endParaRPr lang="fr-FR" sz="1200" dirty="0" smtClean="0">
-              <a:latin typeface="Nunito" panose="02000503030000020003" pitchFamily="2" charset="0"/>
-            </a:endParaRPr>
-          </a:p>
-        </p:txBody>
-      </p:sp>
-      <p:pic>
-        <p:nvPicPr>
-          <p:cNvPr id="5" name="Image 4"/>
-          <p:cNvPicPr>
-            <a:picLocks noChangeAspect="1"/>
-          </p:cNvPicPr>
-          <p:nvPr/>
-        </p:nvPicPr>
-        <p:blipFill>
-          <a:blip r:embed="rId2">
-            <a:extLst>
-              <a:ext uri="{28A0092B-C50C-407E-A947-70E740481C1C}">
-                <a14:useLocalDpi xmlns:a14="http://schemas.microsoft.com/office/drawing/2010/main" val="0"/>
-              </a:ext>
-            </a:extLst>
-          </a:blip>
-          <a:stretch>
-            <a:fillRect/>
-          </a:stretch>
-        </p:blipFill>
-        <p:spPr>
-          <a:xfrm>
-            <a:off x="146641" y="113309"/>
-            <a:ext cx="491115" cy="665919"/>
-          </a:xfrm>
-          <a:prstGeom prst="rect">
-            <a:avLst/>
-          </a:prstGeom>
-        </p:spPr>
-      </p:pic>
-      <p:pic>
-        <p:nvPicPr>
-          <p:cNvPr id="8" name="Image 7"/>
-          <p:cNvPicPr>
-            <a:picLocks noChangeAspect="1"/>
-          </p:cNvPicPr>
-          <p:nvPr/>
-        </p:nvPicPr>
-        <p:blipFill>
-          <a:blip r:embed="rId3">
-            <a:extLst>
-              <a:ext uri="{28A0092B-C50C-407E-A947-70E740481C1C}">
-                <a14:useLocalDpi xmlns:a14="http://schemas.microsoft.com/office/drawing/2010/main" val="0"/>
-              </a:ext>
-            </a:extLst>
-          </a:blip>
-          <a:stretch>
-            <a:fillRect/>
-          </a:stretch>
-        </p:blipFill>
-        <p:spPr>
-          <a:xfrm>
-            <a:off x="1983465" y="1543393"/>
-            <a:ext cx="2248875" cy="1948070"/>
-          </a:xfrm>
-          <a:prstGeom prst="rect">
-            <a:avLst/>
-          </a:prstGeom>
-        </p:spPr>
-      </p:pic>
-      <p:pic>
-        <p:nvPicPr>
-          <p:cNvPr id="6" name="Image 5"/>
-          <p:cNvPicPr>
-            <a:picLocks noChangeAspect="1"/>
-          </p:cNvPicPr>
-          <p:nvPr/>
-        </p:nvPicPr>
-        <p:blipFill>
-          <a:blip r:embed="rId4">
-            <a:extLst>
-              <a:ext uri="{28A0092B-C50C-407E-A947-70E740481C1C}">
-                <a14:useLocalDpi xmlns:a14="http://schemas.microsoft.com/office/drawing/2010/main" val="0"/>
-              </a:ext>
-            </a:extLst>
-          </a:blip>
-          <a:stretch>
-            <a:fillRect/>
-          </a:stretch>
-        </p:blipFill>
-        <p:spPr>
-          <a:xfrm>
-            <a:off x="8997840" y="2821968"/>
-            <a:ext cx="1909249" cy="1186329"/>
-          </a:xfrm>
-          <a:prstGeom prst="rect">
-            <a:avLst/>
-          </a:prstGeom>
-        </p:spPr>
-      </p:pic>
-    </p:spTree>
-    <p:extLst>
-      <p:ext uri="{BB962C8B-B14F-4D97-AF65-F5344CB8AC3E}">
-        <p14:creationId xmlns:p14="http://schemas.microsoft.com/office/powerpoint/2010/main" val="3758080921"/>
-      </p:ext>
-    </p:extLst>
-  </p:cSld>
-  <p:clrMapOvr>
-    <a:masterClrMapping/>
-  </p:clrMapOvr>
-</p:sld>
-</file>
-
-<file path=ppt/slides/slide8.xml><?xml version="1.0" encoding="utf-8"?>
+<file path=ppt/slides/slide9.xml><?xml version="1.0" encoding="utf-8"?>
 <p:sld xmlns:a="http://schemas.openxmlformats.org/drawingml/2006/main" xmlns:r="http://schemas.openxmlformats.org/officeDocument/2006/relationships" xmlns:p="http://schemas.openxmlformats.org/presentationml/2006/main">
   <p:cSld>
     <p:spTree>

</xml_diff>